<commit_message>
winner winner chicken dinner
</commit_message>
<xml_diff>
--- a/cubic_darts.pptx
+++ b/cubic_darts.pptx
@@ -5798,22 +5798,39 @@
         </p:nvSpPr>
         <p:spPr>
           <a:xfrm>
-            <a:off x="2497137" y="1261536"/>
-            <a:ext cx="7197726" cy="2421464"/>
-          </a:xfrm>
-        </p:spPr>
-        <p:txBody>
-          <a:bodyPr/>
-          <a:lstStyle/>
-          <a:p>
-            <a:r>
-              <a:rPr lang="hu-HU" dirty="0" err="1"/>
-              <a:t>Cube</a:t>
-            </a:r>
-            <a:r>
-              <a:rPr lang="hu-HU" dirty="0"/>
+            <a:off x="0" y="640080"/>
+            <a:ext cx="12192000" cy="3042920"/>
+          </a:xfrm>
+        </p:spPr>
+        <p:txBody>
+          <a:bodyPr>
+            <a:noAutofit/>
+          </a:bodyPr>
+          <a:lstStyle/>
+          <a:p>
+            <a:pPr algn="ctr"/>
+            <a:r>
+              <a:rPr lang="hu-HU" sz="4000" u="sng" dirty="0" err="1"/>
+              <a:t>Cubic</a:t>
+            </a:r>
+            <a:r>
+              <a:rPr lang="hu-HU" sz="4000" u="sng" dirty="0"/>
               <a:t> darts</a:t>
             </a:r>
+            <a:br>
+              <a:rPr lang="hu-HU" sz="4000" dirty="0"/>
+            </a:br>
+            <a:br>
+              <a:rPr lang="hu-HU" sz="4000" dirty="0"/>
+            </a:br>
+            <a:r>
+              <a:rPr lang="en-US" sz="4000" dirty="0"/>
+              <a:t>Galactic Games: Fun in a Microgravity Environment!</a:t>
+            </a:r>
+            <a:br>
+              <a:rPr lang="en-US" sz="4000" dirty="0"/>
+            </a:br>
+            <a:endParaRPr lang="hu-HU" sz="4000" dirty="0"/>
           </a:p>
         </p:txBody>
       </p:sp>
@@ -5835,23 +5852,62 @@
         </p:nvSpPr>
         <p:spPr>
           <a:xfrm>
-            <a:off x="2497137" y="4057119"/>
-            <a:ext cx="7197726" cy="1405467"/>
+            <a:off x="5021991" y="4425255"/>
+            <a:ext cx="2148015" cy="1408176"/>
           </a:xfrm>
         </p:spPr>
         <p:txBody>
           <a:bodyPr/>
           <a:lstStyle/>
           <a:p>
+            <a:pPr algn="ctr"/>
             <a:r>
               <a:rPr lang="hu-HU" dirty="0"/>
               <a:t>Angyal Sándor</a:t>
             </a:r>
           </a:p>
           <a:p>
+            <a:pPr algn="ctr"/>
             <a:r>
               <a:rPr lang="hu-HU" dirty="0"/>
               <a:t>Fekete Adrián</a:t>
+            </a:r>
+          </a:p>
+        </p:txBody>
+      </p:sp>
+      <p:sp>
+        <p:nvSpPr>
+          <p:cNvPr id="5" name="Szövegdoboz 4">
+            <a:extLst>
+              <a:ext uri="{FF2B5EF4-FFF2-40B4-BE49-F238E27FC236}">
+                <a16:creationId xmlns:a16="http://schemas.microsoft.com/office/drawing/2014/main" id="{E151F813-B565-7ACA-1021-DE0C7C1EAB18}"/>
+              </a:ext>
+            </a:extLst>
+          </p:cNvPr>
+          <p:cNvSpPr txBox="1"/>
+          <p:nvPr/>
+        </p:nvSpPr>
+        <p:spPr>
+          <a:xfrm>
+            <a:off x="4902211" y="3840480"/>
+            <a:ext cx="2387577" cy="584775"/>
+          </a:xfrm>
+          <a:prstGeom prst="rect">
+            <a:avLst/>
+          </a:prstGeom>
+          <a:noFill/>
+        </p:spPr>
+        <p:txBody>
+          <a:bodyPr wrap="none" rtlCol="0">
+            <a:spAutoFit/>
+          </a:bodyPr>
+          <a:lstStyle/>
+          <a:p>
+            <a:r>
+              <a:rPr lang="hu-HU" sz="3200" u="sng" dirty="0">
+                <a:latin typeface="+mj-lt"/>
+              </a:rPr>
+              <a:t>FELLOW KIDS</a:t>
             </a:r>
           </a:p>
         </p:txBody>
@@ -6038,45 +6094,6 @@
           </a:p>
         </p:txBody>
       </p:sp>
-      <p:sp>
-        <p:nvSpPr>
-          <p:cNvPr id="20" name="Szövegdoboz 19">
-            <a:extLst>
-              <a:ext uri="{FF2B5EF4-FFF2-40B4-BE49-F238E27FC236}">
-                <a16:creationId xmlns:a16="http://schemas.microsoft.com/office/drawing/2014/main" id="{F20E8CC1-7F58-F154-1938-FA380E02490E}"/>
-              </a:ext>
-            </a:extLst>
-          </p:cNvPr>
-          <p:cNvSpPr txBox="1"/>
-          <p:nvPr/>
-        </p:nvSpPr>
-        <p:spPr>
-          <a:xfrm>
-            <a:off x="4529137" y="4326123"/>
-            <a:ext cx="2133600" cy="369332"/>
-          </a:xfrm>
-          <a:prstGeom prst="rect">
-            <a:avLst/>
-          </a:prstGeom>
-          <a:noFill/>
-        </p:spPr>
-        <p:txBody>
-          <a:bodyPr wrap="square" rtlCol="0">
-            <a:spAutoFit/>
-          </a:bodyPr>
-          <a:lstStyle/>
-          <a:p>
-            <a:r>
-              <a:rPr lang="hu-HU" dirty="0">
-                <a:solidFill>
-                  <a:srgbClr val="92D050"/>
-                </a:solidFill>
-              </a:rPr>
-              <a:t>MAKE IT SAFE OFC</a:t>
-            </a:r>
-          </a:p>
-        </p:txBody>
-      </p:sp>
     </p:spTree>
     <p:extLst>
       <p:ext uri="{BB962C8B-B14F-4D97-AF65-F5344CB8AC3E}">
@@ -6130,7 +6147,7 @@
           <a:p>
             <a:r>
               <a:rPr lang="hu-HU" dirty="0"/>
-              <a:t>HOW TO PLAY CUBIC DARTS</a:t>
+              <a:t>CUBIC DARTS</a:t>
             </a:r>
           </a:p>
         </p:txBody>
@@ -6153,30 +6170,68 @@
         </p:nvSpPr>
         <p:spPr>
           <a:xfrm>
-            <a:off x="685801" y="2142067"/>
-            <a:ext cx="4007311" cy="4304334"/>
-          </a:xfrm>
-        </p:spPr>
-        <p:txBody>
-          <a:bodyPr/>
-          <a:lstStyle/>
-          <a:p>
-            <a:r>
-              <a:rPr lang="hu-HU" dirty="0"/>
-              <a:t>Juttasd át a golyót a táblán</a:t>
-            </a:r>
-          </a:p>
-          <a:p>
-            <a:r>
-              <a:rPr lang="hu-HU" dirty="0"/>
-              <a:t>Emeljük ki az ütőt és a labdát (de ne nagyon), mert addig erről nem volt szó</a:t>
-            </a:r>
-          </a:p>
-          <a:p>
-            <a:r>
-              <a:rPr lang="hu-HU" dirty="0"/>
-              <a:t>Dartsnak megfelelő pontozás, vagy egyéni játék létrehozása a világítással</a:t>
-            </a:r>
+            <a:off x="535136" y="2602041"/>
+            <a:ext cx="4007311" cy="1653917"/>
+          </a:xfrm>
+        </p:spPr>
+        <p:txBody>
+          <a:bodyPr anchor="t">
+            <a:normAutofit/>
+          </a:bodyPr>
+          <a:lstStyle/>
+          <a:p>
+            <a:r>
+              <a:rPr lang="hu-HU" sz="2400" dirty="0" err="1"/>
+              <a:t>Two-person</a:t>
+            </a:r>
+            <a:r>
+              <a:rPr lang="hu-HU" sz="2400" dirty="0"/>
+              <a:t> game</a:t>
+            </a:r>
+          </a:p>
+          <a:p>
+            <a:r>
+              <a:rPr lang="hu-HU" sz="2400" dirty="0" err="1"/>
+              <a:t>Microgravity</a:t>
+            </a:r>
+            <a:r>
+              <a:rPr lang="hu-HU" sz="2400" dirty="0"/>
+              <a:t> </a:t>
+            </a:r>
+            <a:r>
+              <a:rPr lang="hu-HU" sz="2400" dirty="0" err="1"/>
+              <a:t>friendly</a:t>
+            </a:r>
+            <a:endParaRPr lang="hu-HU" sz="2400" dirty="0"/>
+          </a:p>
+          <a:p>
+            <a:r>
+              <a:rPr lang="hu-HU" sz="2400" dirty="0" err="1"/>
+              <a:t>Physical</a:t>
+            </a:r>
+            <a:r>
+              <a:rPr lang="hu-HU" sz="2400" dirty="0"/>
+              <a:t> and </a:t>
+            </a:r>
+            <a:r>
+              <a:rPr lang="hu-HU" sz="2400" dirty="0" err="1"/>
+              <a:t>mental</a:t>
+            </a:r>
+            <a:r>
+              <a:rPr lang="hu-HU" sz="2400" dirty="0"/>
+              <a:t> </a:t>
+            </a:r>
+            <a:r>
+              <a:rPr lang="hu-HU" sz="2400" dirty="0" err="1"/>
+              <a:t>activity</a:t>
+            </a:r>
+            <a:endParaRPr lang="hu-HU" sz="2400" dirty="0"/>
+          </a:p>
+          <a:p>
+            <a:endParaRPr lang="hu-HU" sz="2400" dirty="0"/>
+          </a:p>
+          <a:p>
+            <a:endParaRPr lang="hu-HU" sz="2400" dirty="0"/>
           </a:p>
         </p:txBody>
       </p:sp>
@@ -6445,36 +6500,43 @@
         </p:nvSpPr>
         <p:spPr>
           <a:xfrm>
-            <a:off x="685802" y="2142067"/>
-            <a:ext cx="4800436" cy="3649133"/>
-          </a:xfrm>
-        </p:spPr>
-        <p:txBody>
-          <a:bodyPr/>
-          <a:lstStyle/>
-          <a:p>
-            <a:r>
-              <a:rPr lang="hu-HU" dirty="0"/>
-              <a:t>Az elemeket úgy rakod össze ahogy akarod</a:t>
-            </a:r>
-          </a:p>
-          <a:p>
-            <a:r>
-              <a:rPr lang="hu-HU" dirty="0"/>
-              <a:t>Tudnak az elemek világítani</a:t>
-            </a:r>
-          </a:p>
-          <a:p>
-            <a:r>
-              <a:rPr lang="hu-HU" dirty="0"/>
-              <a:t>Könnyen szétszedhető, kis helyen elfér</a:t>
-            </a:r>
-          </a:p>
-          <a:p>
-            <a:r>
-              <a:rPr lang="hu-HU" dirty="0"/>
-              <a:t>Programozd a saját játékszabályaid</a:t>
-            </a:r>
+            <a:off x="612650" y="1895179"/>
+            <a:ext cx="2889502" cy="3649133"/>
+          </a:xfrm>
+        </p:spPr>
+        <p:txBody>
+          <a:bodyPr>
+            <a:normAutofit/>
+          </a:bodyPr>
+          <a:lstStyle/>
+          <a:p>
+            <a:r>
+              <a:rPr lang="hu-HU" sz="2400" dirty="0" err="1"/>
+              <a:t>Modular</a:t>
+            </a:r>
+            <a:r>
+              <a:rPr lang="hu-HU" sz="2400" dirty="0"/>
+              <a:t> </a:t>
+            </a:r>
+            <a:r>
+              <a:rPr lang="hu-HU" sz="2400" dirty="0" err="1"/>
+              <a:t>parts</a:t>
+            </a:r>
+            <a:endParaRPr lang="hu-HU" sz="2400" dirty="0"/>
+          </a:p>
+          <a:p>
+            <a:r>
+              <a:rPr lang="hu-HU" sz="2400" dirty="0" err="1"/>
+              <a:t>Programmable</a:t>
+            </a:r>
+            <a:endParaRPr lang="hu-HU" sz="2400" dirty="0"/>
+          </a:p>
+          <a:p>
+            <a:r>
+              <a:rPr lang="hu-HU" sz="2400" dirty="0" err="1"/>
+              <a:t>Compact</a:t>
+            </a:r>
+            <a:endParaRPr lang="hu-HU" sz="2400" dirty="0"/>
           </a:p>
         </p:txBody>
       </p:sp>
@@ -6500,8 +6562,68 @@
         </p:blipFill>
         <p:spPr>
           <a:xfrm>
-            <a:off x="5751513" y="1716029"/>
+            <a:off x="6481005" y="1544961"/>
             <a:ext cx="5386788" cy="4520257"/>
+          </a:xfrm>
+          <a:prstGeom prst="rect">
+            <a:avLst/>
+          </a:prstGeom>
+        </p:spPr>
+      </p:pic>
+      <p:pic>
+        <p:nvPicPr>
+          <p:cNvPr id="10" name="Kép 9">
+            <a:extLst>
+              <a:ext uri="{FF2B5EF4-FFF2-40B4-BE49-F238E27FC236}">
+                <a16:creationId xmlns:a16="http://schemas.microsoft.com/office/drawing/2014/main" id="{43172E4C-D326-AA83-E4A4-9BD25611545E}"/>
+              </a:ext>
+            </a:extLst>
+          </p:cNvPr>
+          <p:cNvPicPr>
+            <a:picLocks noChangeAspect="1"/>
+          </p:cNvPicPr>
+          <p:nvPr/>
+        </p:nvPicPr>
+        <p:blipFill>
+          <a:blip r:embed="rId3"/>
+          <a:stretch>
+            <a:fillRect/>
+          </a:stretch>
+        </p:blipFill>
+        <p:spPr>
+          <a:xfrm>
+            <a:off x="3502152" y="4057857"/>
+            <a:ext cx="2809234" cy="2007361"/>
+          </a:xfrm>
+          <a:prstGeom prst="rect">
+            <a:avLst/>
+          </a:prstGeom>
+        </p:spPr>
+      </p:pic>
+      <p:pic>
+        <p:nvPicPr>
+          <p:cNvPr id="13" name="Kép 12" descr="A képen képernyőkép, pixel, tervezés látható&#10;&#10;Automatikusan generált leírás">
+            <a:extLst>
+              <a:ext uri="{FF2B5EF4-FFF2-40B4-BE49-F238E27FC236}">
+                <a16:creationId xmlns:a16="http://schemas.microsoft.com/office/drawing/2014/main" id="{97B83CA1-E306-63E1-6C81-900A3451417F}"/>
+              </a:ext>
+            </a:extLst>
+          </p:cNvPr>
+          <p:cNvPicPr>
+            <a:picLocks noChangeAspect="1"/>
+          </p:cNvPicPr>
+          <p:nvPr/>
+        </p:nvPicPr>
+        <p:blipFill>
+          <a:blip r:embed="rId4"/>
+          <a:stretch>
+            <a:fillRect/>
+          </a:stretch>
+        </p:blipFill>
+        <p:spPr>
+          <a:xfrm>
+            <a:off x="3502152" y="1544961"/>
+            <a:ext cx="2809234" cy="2371041"/>
           </a:xfrm>
           <a:prstGeom prst="rect">
             <a:avLst/>
@@ -6589,21 +6711,42 @@
           </a:xfrm>
         </p:spPr>
         <p:txBody>
-          <a:bodyPr/>
-          <a:lstStyle/>
-          <a:p>
-            <a:r>
-              <a:rPr lang="hu-HU" dirty="0"/>
-              <a:t>Lyukacsosak az elemek, </a:t>
-            </a:r>
-            <a:r>
-              <a:rPr lang="hu-HU" dirty="0" err="1"/>
-              <a:t>ergó</a:t>
-            </a:r>
-            <a:r>
-              <a:rPr lang="hu-HU" dirty="0"/>
-              <a:t> átlát rajta a lézer</a:t>
-            </a:r>
+          <a:bodyPr>
+            <a:normAutofit/>
+          </a:bodyPr>
+          <a:lstStyle/>
+          <a:p>
+            <a:r>
+              <a:rPr lang="hu-HU" sz="2400" dirty="0" err="1"/>
+              <a:t>Laser-based</a:t>
+            </a:r>
+            <a:r>
+              <a:rPr lang="hu-HU" sz="2400" dirty="0"/>
+              <a:t> </a:t>
+            </a:r>
+            <a:r>
+              <a:rPr lang="hu-HU" sz="2400" dirty="0" err="1"/>
+              <a:t>sensing</a:t>
+            </a:r>
+            <a:endParaRPr lang="hu-HU" sz="2400" dirty="0"/>
+          </a:p>
+          <a:p>
+            <a:r>
+              <a:rPr lang="hu-HU" sz="2400" dirty="0" err="1"/>
+              <a:t>Creative</a:t>
+            </a:r>
+            <a:r>
+              <a:rPr lang="hu-HU" sz="2400" dirty="0"/>
+              <a:t> </a:t>
+            </a:r>
+            <a:r>
+              <a:rPr lang="hu-HU" sz="2400" dirty="0" err="1"/>
+              <a:t>modes</a:t>
+            </a:r>
+            <a:endParaRPr lang="hu-HU" sz="2400" dirty="0"/>
+          </a:p>
+          <a:p>
+            <a:endParaRPr lang="hu-HU" sz="2400" dirty="0"/>
           </a:p>
         </p:txBody>
       </p:sp>
@@ -6689,10 +6832,9 @@
           <a:lstStyle/>
           <a:p>
             <a:r>
-              <a:rPr lang="hu-HU" dirty="0" err="1"/>
-              <a:t>goods</a:t>
-            </a:r>
-            <a:endParaRPr lang="hu-HU" dirty="0"/>
+              <a:rPr lang="hu-HU" dirty="0"/>
+              <a:t>BENEFITS</a:t>
+            </a:r>
           </a:p>
         </p:txBody>
       </p:sp>
@@ -6714,30 +6856,86 @@
         </p:nvSpPr>
         <p:spPr/>
         <p:txBody>
-          <a:bodyPr/>
-          <a:lstStyle/>
-          <a:p>
-            <a:r>
-              <a:rPr lang="hu-HU" dirty="0"/>
-              <a:t>A játék nem csak szórakozásra alkalmas, hanem remek a koordinációs képességek fejlesztésére</a:t>
-            </a:r>
-          </a:p>
-          <a:p>
-            <a:r>
-              <a:rPr lang="hu-HU" dirty="0"/>
-              <a:t>A játékok alapján felmérést/kutatást lehet megállapítani egy asztronauta képességeiről</a:t>
-            </a:r>
-          </a:p>
-          <a:p>
-            <a:r>
-              <a:rPr lang="hu-HU" dirty="0"/>
-              <a:t>Mozognak az asztronauták</a:t>
-            </a:r>
-          </a:p>
-          <a:p>
-            <a:r>
-              <a:rPr lang="hu-HU" dirty="0"/>
-              <a:t>Csapatépítő, feszültségkezelő</a:t>
+          <a:bodyPr>
+            <a:normAutofit/>
+          </a:bodyPr>
+          <a:lstStyle/>
+          <a:p>
+            <a:r>
+              <a:rPr lang="hu-HU" sz="2400" dirty="0"/>
+              <a:t>Team </a:t>
+            </a:r>
+            <a:r>
+              <a:rPr lang="hu-HU" sz="2400" dirty="0" err="1"/>
+              <a:t>builder</a:t>
+            </a:r>
+            <a:r>
+              <a:rPr lang="hu-HU" sz="2400" dirty="0"/>
+              <a:t>, </a:t>
+            </a:r>
+            <a:r>
+              <a:rPr lang="hu-HU" sz="2400" dirty="0" err="1"/>
+              <a:t>stress</a:t>
+            </a:r>
+            <a:r>
+              <a:rPr lang="hu-HU" sz="2400" dirty="0"/>
+              <a:t> management</a:t>
+            </a:r>
+          </a:p>
+          <a:p>
+            <a:r>
+              <a:rPr lang="hu-HU" sz="2400" dirty="0" err="1"/>
+              <a:t>Physical</a:t>
+            </a:r>
+            <a:r>
+              <a:rPr lang="hu-HU" sz="2400" dirty="0"/>
+              <a:t> </a:t>
+            </a:r>
+            <a:r>
+              <a:rPr lang="hu-HU" sz="2400" dirty="0" err="1"/>
+              <a:t>activity</a:t>
+            </a:r>
+            <a:endParaRPr lang="hu-HU" sz="2400" dirty="0"/>
+          </a:p>
+          <a:p>
+            <a:r>
+              <a:rPr lang="hu-HU" sz="2400" dirty="0"/>
+              <a:t>Visual </a:t>
+            </a:r>
+            <a:r>
+              <a:rPr lang="hu-HU" sz="2400" dirty="0" err="1"/>
+              <a:t>coordination</a:t>
+            </a:r>
+            <a:r>
+              <a:rPr lang="hu-HU" sz="2400" dirty="0"/>
+              <a:t> </a:t>
+            </a:r>
+            <a:r>
+              <a:rPr lang="hu-HU" sz="2400" dirty="0" err="1"/>
+              <a:t>development</a:t>
+            </a:r>
+            <a:endParaRPr lang="hu-HU" sz="2400" dirty="0"/>
+          </a:p>
+          <a:p>
+            <a:r>
+              <a:rPr lang="hu-HU" sz="2400" dirty="0"/>
+              <a:t>Research </a:t>
+            </a:r>
+            <a:r>
+              <a:rPr lang="hu-HU" sz="2400" dirty="0" err="1"/>
+              <a:t>on</a:t>
+            </a:r>
+            <a:r>
+              <a:rPr lang="hu-HU" sz="2400" dirty="0"/>
+              <a:t> </a:t>
+            </a:r>
+            <a:r>
+              <a:rPr lang="hu-HU" sz="2400" dirty="0" err="1"/>
+              <a:t>astronaut</a:t>
+            </a:r>
+            <a:r>
+              <a:rPr lang="hu-HU" sz="2400" dirty="0"/>
+              <a:t> performance</a:t>
             </a:r>
           </a:p>
         </p:txBody>

</xml_diff>